<commit_message>
Update de certaines fonctionnalités et rajout des services
</commit_message>
<xml_diff>
--- a/PRESENTATION_BACKEND.pptx
+++ b/PRESENTATION_BACKEND.pptx
@@ -5,7 +5,7 @@
     <p:sldMasterId id="2147483648" r:id="rId1"/>
   </p:sldMasterIdLst>
   <p:notesMasterIdLst>
-    <p:notesMasterId r:id="rId20"/>
+    <p:notesMasterId r:id="rId21"/>
   </p:notesMasterIdLst>
   <p:sldIdLst>
     <p:sldId id="273" r:id="rId2"/>
@@ -25,7 +25,8 @@
     <p:sldId id="269" r:id="rId16"/>
     <p:sldId id="270" r:id="rId17"/>
     <p:sldId id="271" r:id="rId18"/>
-    <p:sldId id="272" r:id="rId19"/>
+    <p:sldId id="274" r:id="rId19"/>
+    <p:sldId id="272" r:id="rId20"/>
   </p:sldIdLst>
   <p:sldSz cx="12192000" cy="6858000"/>
   <p:notesSz cx="6858000" cy="12192000"/>
@@ -127,6 +128,107 @@
     </p:ext>
   </p:extLst>
 </p:presentation>
+</file>
+
+<file path=ppt/revisionInfo.xml><?xml version="1.0" encoding="utf-8"?>
+<p1510:revInfo xmlns:a="http://schemas.openxmlformats.org/drawingml/2006/main" xmlns:r="http://schemas.openxmlformats.org/officeDocument/2006/relationships" xmlns:p1510="http://schemas.microsoft.com/office/powerpoint/2015/10/main">
+  <p1510:revLst>
+    <p1510:client id="{70895A78-70E2-48BA-ADB1-1ED31C9CA565}" v="1" dt="2025-11-28T12:29:40.927"/>
+  </p1510:revLst>
+</p1510:revInfo>
+</file>
+
+<file path=ppt/changesInfos/changesInfo1.xml><?xml version="1.0" encoding="utf-8"?>
+<pc:chgInfo xmlns:a="http://schemas.openxmlformats.org/drawingml/2006/main" xmlns:r="http://schemas.openxmlformats.org/officeDocument/2006/relationships" xmlns:ac="http://schemas.microsoft.com/office/drawing/2013/main/command" xmlns:pc="http://schemas.microsoft.com/office/powerpoint/2013/main/command">
+  <pc:docChgLst>
+    <pc:chgData name="Tiago DA COSTA" userId="036dced3-816d-405f-b04e-e233882c0a59" providerId="ADAL" clId="{2FA1E456-9572-4616-82AF-B4026B673800}"/>
+    <pc:docChg chg="custSel addSld modSld sldOrd">
+      <pc:chgData name="Tiago DA COSTA" userId="036dced3-816d-405f-b04e-e233882c0a59" providerId="ADAL" clId="{2FA1E456-9572-4616-82AF-B4026B673800}" dt="2025-11-28T12:30:25.345" v="29" actId="26606"/>
+      <pc:docMkLst>
+        <pc:docMk/>
+      </pc:docMkLst>
+      <pc:sldChg chg="addSp delSp modSp add mod ord setBg delDesignElem">
+        <pc:chgData name="Tiago DA COSTA" userId="036dced3-816d-405f-b04e-e233882c0a59" providerId="ADAL" clId="{2FA1E456-9572-4616-82AF-B4026B673800}" dt="2025-11-28T12:30:25.345" v="29" actId="26606"/>
+        <pc:sldMkLst>
+          <pc:docMk/>
+          <pc:sldMk cId="4117207123" sldId="274"/>
+        </pc:sldMkLst>
+        <pc:spChg chg="mod">
+          <ac:chgData name="Tiago DA COSTA" userId="036dced3-816d-405f-b04e-e233882c0a59" providerId="ADAL" clId="{2FA1E456-9572-4616-82AF-B4026B673800}" dt="2025-11-28T12:30:25.345" v="29" actId="26606"/>
+          <ac:spMkLst>
+            <pc:docMk/>
+            <pc:sldMk cId="4117207123" sldId="274"/>
+            <ac:spMk id="3" creationId="{19C52494-D0DA-4D3A-FC93-157E09908D08}"/>
+          </ac:spMkLst>
+        </pc:spChg>
+        <pc:spChg chg="add">
+          <ac:chgData name="Tiago DA COSTA" userId="036dced3-816d-405f-b04e-e233882c0a59" providerId="ADAL" clId="{2FA1E456-9572-4616-82AF-B4026B673800}" dt="2025-11-28T12:30:25.345" v="29" actId="26606"/>
+          <ac:spMkLst>
+            <pc:docMk/>
+            <pc:sldMk cId="4117207123" sldId="274"/>
+            <ac:spMk id="5" creationId="{827DC2C4-B485-428A-BF4A-472D2967F47F}"/>
+          </ac:spMkLst>
+        </pc:spChg>
+        <pc:spChg chg="add">
+          <ac:chgData name="Tiago DA COSTA" userId="036dced3-816d-405f-b04e-e233882c0a59" providerId="ADAL" clId="{2FA1E456-9572-4616-82AF-B4026B673800}" dt="2025-11-28T12:30:25.345" v="29" actId="26606"/>
+          <ac:spMkLst>
+            <pc:docMk/>
+            <pc:sldMk cId="4117207123" sldId="274"/>
+            <ac:spMk id="6" creationId="{EE04B5EB-F158-4507-90DD-BD23620C7CC9}"/>
+          </ac:spMkLst>
+        </pc:spChg>
+        <pc:spChg chg="add">
+          <ac:chgData name="Tiago DA COSTA" userId="036dced3-816d-405f-b04e-e233882c0a59" providerId="ADAL" clId="{2FA1E456-9572-4616-82AF-B4026B673800}" dt="2025-11-28T12:30:25.345" v="29" actId="26606"/>
+          <ac:spMkLst>
+            <pc:docMk/>
+            <pc:sldMk cId="4117207123" sldId="274"/>
+            <ac:spMk id="8" creationId="{934F1179-B481-4F9E-BCA3-AFB972070F83}"/>
+          </ac:spMkLst>
+        </pc:spChg>
+        <pc:spChg chg="del">
+          <ac:chgData name="Tiago DA COSTA" userId="036dced3-816d-405f-b04e-e233882c0a59" providerId="ADAL" clId="{2FA1E456-9572-4616-82AF-B4026B673800}" dt="2025-11-28T12:29:40.925" v="1"/>
+          <ac:spMkLst>
+            <pc:docMk/>
+            <pc:sldMk cId="4117207123" sldId="274"/>
+            <ac:spMk id="10" creationId="{556F8D43-3F64-06E0-9218-E59ED2C15A60}"/>
+          </ac:spMkLst>
+        </pc:spChg>
+        <pc:spChg chg="del">
+          <ac:chgData name="Tiago DA COSTA" userId="036dced3-816d-405f-b04e-e233882c0a59" providerId="ADAL" clId="{2FA1E456-9572-4616-82AF-B4026B673800}" dt="2025-11-28T12:29:40.925" v="1"/>
+          <ac:spMkLst>
+            <pc:docMk/>
+            <pc:sldMk cId="4117207123" sldId="274"/>
+            <ac:spMk id="12" creationId="{5333636E-B258-0F46-35F6-529A0FD8AFB3}"/>
+          </ac:spMkLst>
+        </pc:spChg>
+        <pc:spChg chg="del">
+          <ac:chgData name="Tiago DA COSTA" userId="036dced3-816d-405f-b04e-e233882c0a59" providerId="ADAL" clId="{2FA1E456-9572-4616-82AF-B4026B673800}" dt="2025-11-28T12:29:40.925" v="1"/>
+          <ac:spMkLst>
+            <pc:docMk/>
+            <pc:sldMk cId="4117207123" sldId="274"/>
+            <ac:spMk id="14" creationId="{21AEF65C-3310-7F4C-5453-E945A7A83935}"/>
+          </ac:spMkLst>
+        </pc:spChg>
+        <pc:spChg chg="del">
+          <ac:chgData name="Tiago DA COSTA" userId="036dced3-816d-405f-b04e-e233882c0a59" providerId="ADAL" clId="{2FA1E456-9572-4616-82AF-B4026B673800}" dt="2025-11-28T12:29:40.925" v="1"/>
+          <ac:spMkLst>
+            <pc:docMk/>
+            <pc:sldMk cId="4117207123" sldId="274"/>
+            <ac:spMk id="16" creationId="{D7296D8E-64AD-FD08-CFC0-A9AA2C3E7646}"/>
+          </ac:spMkLst>
+        </pc:spChg>
+        <pc:spChg chg="del">
+          <ac:chgData name="Tiago DA COSTA" userId="036dced3-816d-405f-b04e-e233882c0a59" providerId="ADAL" clId="{2FA1E456-9572-4616-82AF-B4026B673800}" dt="2025-11-28T12:29:40.925" v="1"/>
+          <ac:spMkLst>
+            <pc:docMk/>
+            <pc:sldMk cId="4117207123" sldId="274"/>
+            <ac:spMk id="18" creationId="{881544B8-58AF-590D-BF06-304429DCE12F}"/>
+          </ac:spMkLst>
+        </pc:spChg>
+      </pc:sldChg>
+    </pc:docChg>
+  </pc:docChgLst>
+</pc:chgInfo>
 </file>
 
 <file path=ppt/notesMasters/notesMaster1.xml><?xml version="1.0" encoding="utf-8"?>
@@ -2714,6 +2816,315 @@
 </file>
 
 <file path=ppt/slides/slide18.xml><?xml version="1.0" encoding="utf-8"?>
+<p:sld xmlns:a="http://schemas.openxmlformats.org/drawingml/2006/main" xmlns:r="http://schemas.openxmlformats.org/officeDocument/2006/relationships" xmlns:p="http://schemas.openxmlformats.org/presentationml/2006/main">
+  <p:cSld>
+    <p:bg>
+      <p:bgPr>
+        <a:solidFill>
+          <a:schemeClr val="bg1"/>
+        </a:solidFill>
+        <a:effectLst/>
+      </p:bgPr>
+    </p:bg>
+    <p:spTree>
+      <p:nvGrpSpPr>
+        <p:cNvPr id="1" name="">
+          <a:extLst>
+            <a:ext uri="{FF2B5EF4-FFF2-40B4-BE49-F238E27FC236}">
+              <a16:creationId xmlns:a16="http://schemas.microsoft.com/office/drawing/2014/main" id="{F3D547E5-A3BB-F4E0-E8C0-665B23EE6C4B}"/>
+            </a:ext>
+          </a:extLst>
+        </p:cNvPr>
+        <p:cNvGrpSpPr/>
+        <p:nvPr/>
+      </p:nvGrpSpPr>
+      <p:grpSpPr>
+        <a:xfrm>
+          <a:off x="0" y="0"/>
+          <a:ext cx="0" cy="0"/>
+          <a:chOff x="0" y="0"/>
+          <a:chExt cx="0" cy="0"/>
+        </a:xfrm>
+      </p:grpSpPr>
+      <p:sp useBgFill="1">
+        <p:nvSpPr>
+          <p:cNvPr id="8" name="Rectangle 7">
+            <a:extLst>
+              <a:ext uri="{FF2B5EF4-FFF2-40B4-BE49-F238E27FC236}">
+                <a16:creationId xmlns:a16="http://schemas.microsoft.com/office/drawing/2014/main" id="{934F1179-B481-4F9E-BCA3-AFB972070F83}"/>
+              </a:ext>
+              <a:ext uri="{C183D7F6-B498-43B3-948B-1728B52AA6E4}">
+                <adec:decorative xmlns:adec="http://schemas.microsoft.com/office/drawing/2017/decorative" val="1"/>
+              </a:ext>
+            </a:extLst>
+          </p:cNvPr>
+          <p:cNvSpPr>
+            <a:spLocks noGrp="1" noRot="1" noChangeAspect="1" noMove="1" noResize="1" noEditPoints="1" noAdjustHandles="1" noChangeArrowheads="1" noChangeShapeType="1" noTextEdit="1"/>
+          </p:cNvSpPr>
+          <p:nvPr>
+            <p:extLst>
+              <p:ext uri="{386F3935-93C4-4BCD-93E2-E3B085C9AB24}">
+                <p16:designElem xmlns:p16="http://schemas.microsoft.com/office/powerpoint/2015/main" val="1"/>
+              </p:ext>
+            </p:extLst>
+          </p:nvPr>
+        </p:nvSpPr>
+        <p:spPr>
+          <a:xfrm>
+            <a:off x="0" y="0"/>
+            <a:ext cx="12192000" cy="6858000"/>
+          </a:xfrm>
+          <a:prstGeom prst="rect">
+            <a:avLst/>
+          </a:prstGeom>
+          <a:ln>
+            <a:noFill/>
+          </a:ln>
+        </p:spPr>
+        <p:style>
+          <a:lnRef idx="2">
+            <a:schemeClr val="accent1">
+              <a:shade val="50000"/>
+            </a:schemeClr>
+          </a:lnRef>
+          <a:fillRef idx="1">
+            <a:schemeClr val="accent1"/>
+          </a:fillRef>
+          <a:effectRef idx="0">
+            <a:schemeClr val="accent1"/>
+          </a:effectRef>
+          <a:fontRef idx="minor">
+            <a:schemeClr val="lt1"/>
+          </a:fontRef>
+        </p:style>
+        <p:txBody>
+          <a:bodyPr rtlCol="0" anchor="ctr"/>
+          <a:lstStyle/>
+          <a:p>
+            <a:pPr algn="ctr"/>
+            <a:endParaRPr lang="en-US"/>
+          </a:p>
+        </p:txBody>
+      </p:sp>
+      <p:sp>
+        <p:nvSpPr>
+          <p:cNvPr id="5" name="Right Triangle 9">
+            <a:extLst>
+              <a:ext uri="{FF2B5EF4-FFF2-40B4-BE49-F238E27FC236}">
+                <a16:creationId xmlns:a16="http://schemas.microsoft.com/office/drawing/2014/main" id="{827DC2C4-B485-428A-BF4A-472D2967F47F}"/>
+              </a:ext>
+              <a:ext uri="{C183D7F6-B498-43B3-948B-1728B52AA6E4}">
+                <adec:decorative xmlns:adec="http://schemas.microsoft.com/office/drawing/2017/decorative" val="1"/>
+              </a:ext>
+            </a:extLst>
+          </p:cNvPr>
+          <p:cNvSpPr>
+            <a:spLocks noGrp="1" noRot="1" noChangeAspect="1" noMove="1" noResize="1" noEditPoints="1" noAdjustHandles="1" noChangeArrowheads="1" noChangeShapeType="1" noTextEdit="1"/>
+          </p:cNvSpPr>
+          <p:nvPr>
+            <p:extLst>
+              <p:ext uri="{386F3935-93C4-4BCD-93E2-E3B085C9AB24}">
+                <p16:designElem xmlns:p16="http://schemas.microsoft.com/office/powerpoint/2015/main" val="1"/>
+              </p:ext>
+            </p:extLst>
+          </p:nvPr>
+        </p:nvSpPr>
+        <p:spPr>
+          <a:xfrm flipH="1">
+            <a:off x="8576720" y="3335867"/>
+            <a:ext cx="3291840" cy="3200400"/>
+          </a:xfrm>
+          <a:prstGeom prst="rtTriangle">
+            <a:avLst/>
+          </a:prstGeom>
+          <a:solidFill>
+            <a:schemeClr val="accent4"/>
+          </a:solidFill>
+          <a:ln>
+            <a:noFill/>
+          </a:ln>
+        </p:spPr>
+        <p:style>
+          <a:lnRef idx="2">
+            <a:schemeClr val="accent1">
+              <a:shade val="50000"/>
+            </a:schemeClr>
+          </a:lnRef>
+          <a:fillRef idx="1">
+            <a:schemeClr val="accent1"/>
+          </a:fillRef>
+          <a:effectRef idx="0">
+            <a:schemeClr val="accent1"/>
+          </a:effectRef>
+          <a:fontRef idx="minor">
+            <a:schemeClr val="lt1"/>
+          </a:fontRef>
+        </p:style>
+        <p:txBody>
+          <a:bodyPr rtlCol="0" anchor="ctr"/>
+          <a:lstStyle/>
+          <a:p>
+            <a:pPr algn="ctr"/>
+            <a:endParaRPr lang="en-US" dirty="0"/>
+          </a:p>
+        </p:txBody>
+      </p:sp>
+      <p:sp>
+        <p:nvSpPr>
+          <p:cNvPr id="6" name="Rectangle 5">
+            <a:extLst>
+              <a:ext uri="{FF2B5EF4-FFF2-40B4-BE49-F238E27FC236}">
+                <a16:creationId xmlns:a16="http://schemas.microsoft.com/office/drawing/2014/main" id="{EE04B5EB-F158-4507-90DD-BD23620C7CC9}"/>
+              </a:ext>
+              <a:ext uri="{C183D7F6-B498-43B3-948B-1728B52AA6E4}">
+                <adec:decorative xmlns:adec="http://schemas.microsoft.com/office/drawing/2017/decorative" val="1"/>
+              </a:ext>
+            </a:extLst>
+          </p:cNvPr>
+          <p:cNvSpPr>
+            <a:spLocks noGrp="1" noRot="1" noChangeAspect="1" noMove="1" noResize="1" noEditPoints="1" noAdjustHandles="1" noChangeArrowheads="1" noChangeShapeType="1" noTextEdit="1"/>
+          </p:cNvSpPr>
+          <p:nvPr>
+            <p:extLst>
+              <p:ext uri="{386F3935-93C4-4BCD-93E2-E3B085C9AB24}">
+                <p16:designElem xmlns:p16="http://schemas.microsoft.com/office/powerpoint/2015/main" val="1"/>
+              </p:ext>
+            </p:extLst>
+          </p:nvPr>
+        </p:nvSpPr>
+        <p:spPr>
+          <a:xfrm>
+            <a:off x="641774" y="623275"/>
+            <a:ext cx="10905053" cy="5607882"/>
+          </a:xfrm>
+          <a:prstGeom prst="rect">
+            <a:avLst/>
+          </a:prstGeom>
+          <a:noFill/>
+          <a:ln w="19050">
+            <a:solidFill>
+              <a:schemeClr val="tx1">
+                <a:lumMod val="75000"/>
+                <a:lumOff val="25000"/>
+              </a:schemeClr>
+            </a:solidFill>
+          </a:ln>
+        </p:spPr>
+        <p:style>
+          <a:lnRef idx="2">
+            <a:schemeClr val="accent1">
+              <a:shade val="50000"/>
+            </a:schemeClr>
+          </a:lnRef>
+          <a:fillRef idx="1">
+            <a:schemeClr val="accent1"/>
+          </a:fillRef>
+          <a:effectRef idx="0">
+            <a:schemeClr val="accent1"/>
+          </a:effectRef>
+          <a:fontRef idx="minor">
+            <a:schemeClr val="lt1"/>
+          </a:fontRef>
+        </p:style>
+        <p:txBody>
+          <a:bodyPr rtlCol="0" anchor="ctr"/>
+          <a:lstStyle/>
+          <a:p>
+            <a:pPr algn="ctr"/>
+            <a:endParaRPr lang="en-US"/>
+          </a:p>
+        </p:txBody>
+      </p:sp>
+      <p:sp>
+        <p:nvSpPr>
+          <p:cNvPr id="3" name="ZoneTexte 2">
+            <a:extLst>
+              <a:ext uri="{FF2B5EF4-FFF2-40B4-BE49-F238E27FC236}">
+                <a16:creationId xmlns:a16="http://schemas.microsoft.com/office/drawing/2014/main" id="{19C52494-D0DA-4D3A-FC93-157E09908D08}"/>
+              </a:ext>
+            </a:extLst>
+          </p:cNvPr>
+          <p:cNvSpPr txBox="1"/>
+          <p:nvPr/>
+        </p:nvSpPr>
+        <p:spPr>
+          <a:xfrm>
+            <a:off x="1285241" y="1008993"/>
+            <a:ext cx="9231410" cy="3542045"/>
+          </a:xfrm>
+          <a:prstGeom prst="rect">
+            <a:avLst/>
+          </a:prstGeom>
+        </p:spPr>
+        <p:txBody>
+          <a:bodyPr vert="horz" lIns="91440" tIns="45720" rIns="91440" bIns="45720" rtlCol="0" anchor="b">
+            <a:normAutofit/>
+          </a:bodyPr>
+          <a:lstStyle/>
+          <a:p>
+            <a:pPr>
+              <a:lnSpc>
+                <a:spcPct val="90000"/>
+              </a:lnSpc>
+              <a:spcBef>
+                <a:spcPct val="0"/>
+              </a:spcBef>
+              <a:spcAft>
+                <a:spcPts val="600"/>
+              </a:spcAft>
+            </a:pPr>
+            <a:r>
+              <a:rPr lang="en-US" sz="11500" kern="1200" dirty="0">
+                <a:solidFill>
+                  <a:schemeClr val="tx1"/>
+                </a:solidFill>
+                <a:latin typeface="+mj-lt"/>
+                <a:ea typeface="+mj-ea"/>
+                <a:cs typeface="+mj-cs"/>
+              </a:rPr>
+              <a:t>PRÉSENTATION</a:t>
+            </a:r>
+          </a:p>
+          <a:p>
+            <a:pPr>
+              <a:lnSpc>
+                <a:spcPct val="90000"/>
+              </a:lnSpc>
+              <a:spcBef>
+                <a:spcPct val="0"/>
+              </a:spcBef>
+              <a:spcAft>
+                <a:spcPts val="600"/>
+              </a:spcAft>
+            </a:pPr>
+            <a:r>
+              <a:rPr lang="en-US" sz="11500" kern="1200" dirty="0">
+                <a:solidFill>
+                  <a:schemeClr val="tx1"/>
+                </a:solidFill>
+                <a:latin typeface="+mj-lt"/>
+                <a:ea typeface="+mj-ea"/>
+                <a:cs typeface="+mj-cs"/>
+              </a:rPr>
+              <a:t>FRONTEND</a:t>
+            </a:r>
+          </a:p>
+        </p:txBody>
+      </p:sp>
+    </p:spTree>
+    <p:extLst>
+      <p:ext uri="{BB962C8B-B14F-4D97-AF65-F5344CB8AC3E}">
+        <p14:creationId xmlns:p14="http://schemas.microsoft.com/office/powerpoint/2010/main" val="4117207123"/>
+      </p:ext>
+    </p:extLst>
+  </p:cSld>
+  <p:clrMapOvr>
+    <a:masterClrMapping/>
+  </p:clrMapOvr>
+</p:sld>
+</file>
+
+<file path=ppt/slides/slide19.xml><?xml version="1.0" encoding="utf-8"?>
 <p:sld xmlns:a="http://schemas.openxmlformats.org/drawingml/2006/main" xmlns:r="http://schemas.openxmlformats.org/officeDocument/2006/relationships" xmlns:p="http://schemas.openxmlformats.org/presentationml/2006/main">
   <p:cSld>
     <p:bg>

</xml_diff>